<commit_message>
Replace ChromaDB with FAISS and fix evaluation pipeline
- src/retriever.py: replaced ChromaDB (segfaulting Rust binary) with
  FAISS IndexFlatIP; cosine similarity via L2-normalised inner product;
  index persists to chroma_db/*.faiss + *.pkl
- requirements.txt: chromadb -> faiss-cpu>=1.7.0
- README.md: updated architecture diagram, design choices table, and
  project structure to reflect FAISS
- evaluation/run_evaluation.py: fixed Windows cp1252 Unicode encoding
  errors (replaced non-ASCII box-drawing and check/cross chars)
- BNR-DS-Challenge-Geredi-Niyibigira.pptx: updated slides to reflect
  FAISS migration and real evaluation results (4/5 pass)
</commit_message>
<xml_diff>
--- a/BNR-DS-Challenge-Geredi-Niyibigira.pptx
+++ b/BNR-DS-Challenge-Geredi-Niyibigira.pptx
@@ -16587,7 +16587,7 @@
                 <a:cs typeface="Calibri"/>
                 <a:sym typeface="Calibri"/>
               </a:rPr>
-              <a:t>3  ChromaDB</a:t>
+              <a:t>3  FAISS Vector Index</a:t>
             </a:r>
             <a:br>
               <a:rPr b="0" i="0" lang="en" sz="1400" u="none" cap="none" strike="noStrike">
@@ -16610,7 +16610,7 @@
                 <a:cs typeface="Calibri"/>
                 <a:sym typeface="Calibri"/>
               </a:rPr>
-              <a:t>Cosine similarity, top-5 chunks</a:t>
+              <a:t>Cosine similarity (IndexFlatIP), top-5 chunks</a:t>
             </a:r>
             <a:endParaRPr/>
           </a:p>
@@ -17264,7 +17264,7 @@
                 <a:cs typeface="Calibri"/>
                 <a:sym typeface="Calibri"/>
               </a:rPr>
-              <a:t>  ChromaDB (persistent)</a:t>
+              <a:t>FAISS IndexFlatIP</a:t>
             </a:r>
             <a:endParaRPr/>
           </a:p>
@@ -17288,7 +17288,7 @@
                 <a:cs typeface="Calibri"/>
                 <a:sym typeface="Calibri"/>
               </a:rPr>
-              <a:t>  Cosine similarity</a:t>
+              <a:t>Persistent, exact search</a:t>
             </a:r>
             <a:endParaRPr/>
           </a:p>
@@ -18196,7 +18196,7 @@
                 <a:cs typeface="Calibri"/>
                 <a:sym typeface="Calibri"/>
               </a:rPr>
-              <a:t>ChromaDB persists to disk (chroma_db/). Re-indexing only needed when the corpus changes — cold start avoided on every query.</a:t>
+              <a:t>FAISS IndexFlatIP persists to disk (chroma_db/*.faiss + *.pkl). Re-indexing only needed when the corpus changes — cold start avoided on every query.</a:t>
             </a:r>
             <a:endParaRPr/>
           </a:p>
@@ -19871,7 +19871,7 @@
                 <a:cs typeface="Calibri"/>
                 <a:sym typeface="Calibri"/>
               </a:rPr>
-              <a:t>Retrieved: GSMA 2025 pp. 70–77 (sim 0.72–0.77)  |  Latency: 5.7 s</a:t>
+              <a:t>Retrieved: GSMA 2025 p.76 (0.790), p.72 (0.754)  +  FinScope 2024 p.40 (0.766), p.36 (0.732)  |  Latency: 4.6 s</a:t>
             </a:r>
             <a:br>
               <a:rPr b="0" i="0" lang="en" sz="1100" u="none" cap="none" strike="noStrike">
@@ -19894,7 +19894,7 @@
                 <a:cs typeface="Calibri"/>
                 <a:sym typeface="Calibri"/>
               </a:rPr>
-              <a:t>Answer: Detailed &amp; accurate — Pakistan women 70% less likely to own accounts; frequency &amp; transaction-type gaps quantified. Limitation: Rwanda-specific gender data (FinScope) was not retrieved — single-document bias toward GSMA.</a:t>
+              <a:t>Answer: In Rwanda, 73% of women vs 82% of men have transactional accounts (9-pt gap). Globally: women in LMICs 8% less likely to own a mobile phone; gaps in 8 of 12 countries surveyed; transaction-type differences quantified by country (salary receipt: 5% women vs 16% men in Senegal).</a:t>
             </a:r>
             <a:endParaRPr/>
           </a:p>
@@ -20114,7 +20114,7 @@
                 <a:cs typeface="Calibri"/>
                 <a:sym typeface="Calibri"/>
               </a:rPr>
-              <a:t>Retrieved: Law No. 061/2021 p.1 + p.40; FinScope pp. 60, 61 (sim 0.67–0.76)  |  Latency: 5.3 s</a:t>
+              <a:t>Retrieved: Payment Law p.1 (0.694), FinScope p.60 (0.695), IMF FAS (0.648)  |  Latency: 3.2 s</a:t>
             </a:r>
             <a:br>
               <a:rPr b="0" i="0" lang="en" sz="1100" u="none" cap="none" strike="noStrike">
@@ -20137,7 +20137,7 @@
                 <a:cs typeface="Calibri"/>
                 <a:sym typeface="Calibri"/>
               </a:rPr>
-              <a:t>Answer: Multi-source synthesis — Art. 4 (General Powers), Art. 5 (Investigative), Interoperability, RNPS Strategy 2018–2024. Limitation: strategic role cited via FinScope (secondary) rather than the law itself; one article number not specified.</a:t>
+              <a:t>Answer: Chapter II of Law 061/2021 grants NBR general powers (Art. 4) and investigative powers (Art. 5). FinScope adds strategic context: NBR drives RNPS 2018-2024, targets 100% electronic payment adoption. Limitation: retrieved TOC page instead of article body text on first run.</a:t>
             </a:r>
             <a:endParaRPr/>
           </a:p>
@@ -20303,7 +20303,7 @@
                 <a:cs typeface="Calibri"/>
                 <a:sym typeface="Calibri"/>
               </a:rPr>
-              <a:t>Q4 — Has digital payment adoption increased?  [CRITICAL FAILURE CASE]</a:t>
+              <a:t>Q4  |  PASS  |  Mobile money accounts in Rwanda in 2022?  (IMF survey)</a:t>
             </a:r>
             <a:endParaRPr/>
           </a:p>
@@ -20353,7 +20353,7 @@
                 <a:cs typeface="Calibri"/>
                 <a:sym typeface="Calibri"/>
               </a:rPr>
-              <a:t>Retrieved: GSMA pp. 57–61 — ALL similarity scores &lt; 0.58 (weakest in evaluation)  |  Latency: 5.9 s</a:t>
+              <a:t>Retrieved: IMF Financial Access Survey — all 5 chunks, sim 0.770–0.795 (strongest retrieval in evaluation)  |  Latency: 2.2 s</a:t>
             </a:r>
             <a:br>
               <a:rPr b="0" i="0" lang="en" sz="1100" u="none" cap="none" strike="noStrike">
@@ -20376,7 +20376,7 @@
                 <a:cs typeface="Calibri"/>
                 <a:sym typeface="Calibri"/>
               </a:rPr>
-              <a:t>Answer: Confident ASEAN-region statistics returned despite low retrieval confidence. Q1 with HIGHER scores (0.72) correctly refused; this did not. Root cause: no minimum similarity threshold gate — fixed by adding cutoff ≥ 0.65.</a:t>
+              <a:t>Answer: 1,969.62 registered mobile money accounts per 1,000 adults in Rwanda in 2022. Active accounts: 714.98 per 1,000 adults. Demonstrates correct parsing of structured CSV data with precise numeric citation from the IMF dataset.</a:t>
             </a:r>
             <a:endParaRPr/>
           </a:p>
@@ -20828,7 +20828,7 @@
                 <a:cs typeface="Calibri"/>
                 <a:sym typeface="Calibri"/>
               </a:rPr>
-              <a:t>• Honest partial answer on Q5</a:t>
+              <a:t>• Out-of-corpus question correctly refused (Q5)</a:t>
             </a:r>
             <a:endParaRPr/>
           </a:p>
@@ -21092,7 +21092,7 @@
                 <a:cs typeface="Calibri"/>
                 <a:sym typeface="Calibri"/>
               </a:rPr>
-              <a:t>• Q4: sim &lt; 0.58 → confident answer (no gate)</a:t>
+              <a:t>• Q1: barriers scattered across pages, no single chunk captures them</a:t>
             </a:r>
             <a:endParaRPr/>
           </a:p>
@@ -21116,7 +21116,7 @@
                 <a:cs typeface="Calibri"/>
                 <a:sym typeface="Calibri"/>
               </a:rPr>
-              <a:t>• Q2: Rwanda gender data not retrieved</a:t>
+              <a:t>• Q2: Rwanda-specific gender data underweighted vs GSMA global data</a:t>
             </a:r>
             <a:endParaRPr/>
           </a:p>
@@ -21140,7 +21140,7 @@
                 <a:cs typeface="Calibri"/>
                 <a:sym typeface="Calibri"/>
               </a:rPr>
-              <a:t>• Q5: GSMA not surfaced for comparison</a:t>
+              <a:t>• Similarity threshold not enforced — low-sim answers not gated</a:t>
             </a:r>
             <a:endParaRPr/>
           </a:p>
@@ -21164,7 +21164,7 @@
                 <a:cs typeface="Calibri"/>
                 <a:sym typeface="Calibri"/>
               </a:rPr>
-              <a:t>• Q1: 'barriers' semantically missed in top-5</a:t>
+              <a:t>• PDF tables and figures not extracted by pypdf</a:t>
             </a:r>
             <a:endParaRPr/>
           </a:p>
@@ -21998,7 +21998,7 @@
                 <a:cs typeface="Calibri"/>
                 <a:sym typeface="Calibri"/>
               </a:rPr>
-              <a:t>Q4  Digital payment adoption</a:t>
+              <a:t>Q4  IMF mobile money accounts 2022</a:t>
             </a:r>
             <a:endParaRPr/>
           </a:p>
@@ -22048,7 +22048,7 @@
                 <a:cs typeface="Calibri"/>
                 <a:sym typeface="Calibri"/>
               </a:rPr>
-              <a:t>0.508–0.579</a:t>
+              <a:t>0.770–0.795</a:t>
             </a:r>
             <a:endParaRPr/>
           </a:p>
@@ -22098,7 +22098,7 @@
                 <a:cs typeface="Calibri"/>
                 <a:sym typeface="Calibri"/>
               </a:rPr>
-              <a:t>Confident answer (LOW)</a:t>
+              <a:t>Precise numeric answer</a:t>
             </a:r>
             <a:endParaRPr/>
           </a:p>
@@ -22141,14 +22141,14 @@
             <a:r>
               <a:rPr b="1" i="0" lang="en" sz="1300" u="none" cap="none" strike="noStrike">
                 <a:solidFill>
-                  <a:srgbClr val="CC3333"/>
+                  <a:srgbClr val="1A8C4E"/>
                 </a:solidFill>
                 <a:latin typeface="Calibri"/>
                 <a:ea typeface="Calibri"/>
                 <a:cs typeface="Calibri"/>
                 <a:sym typeface="Calibri"/>
               </a:rPr>
-              <a:t>✗</a:t>
+              <a:t>✓</a:t>
             </a:r>
             <a:endParaRPr/>
           </a:p>
@@ -22198,7 +22198,7 @@
                 <a:cs typeface="Calibri"/>
                 <a:sym typeface="Calibri"/>
               </a:rPr>
-              <a:t>Q5  Rwanda vs global trends</a:t>
+              <a:t>Q5  US inflation rate  [out-of-corpus]</a:t>
             </a:r>
             <a:endParaRPr/>
           </a:p>
@@ -22248,7 +22248,7 @@
                 <a:cs typeface="Calibri"/>
                 <a:sym typeface="Calibri"/>
               </a:rPr>
-              <a:t>0.699–0.775</a:t>
+              <a:t>0.337–0.377</a:t>
             </a:r>
             <a:endParaRPr/>
           </a:p>
@@ -22298,7 +22298,7 @@
                 <a:cs typeface="Calibri"/>
                 <a:sym typeface="Calibri"/>
               </a:rPr>
-              <a:t>Honest partial answer</a:t>
+              <a:t>Correctly refused</a:t>
             </a:r>
             <a:endParaRPr/>
           </a:p>
@@ -22982,7 +22982,7 @@
                 <a:cs typeface="Calibri"/>
                 <a:sym typeface="Calibri"/>
               </a:rPr>
-              <a:t>• Vector DB:  ChromaDB EphemeralClient</a:t>
+              <a:t>• Vector DB:  FAISS IndexFlatIP (local, no external service)</a:t>
             </a:r>
             <a:endParaRPr/>
           </a:p>
@@ -23006,7 +23006,7 @@
                 <a:cs typeface="Calibri"/>
                 <a:sym typeface="Calibri"/>
               </a:rPr>
-              <a:t>  In-memory, rebuilt on cold start</a:t>
+              <a:t>Index rebuilt on cold start (~20-30 s)</a:t>
             </a:r>
             <a:endParaRPr/>
           </a:p>
@@ -23030,7 +23030,7 @@
                 <a:cs typeface="Calibri"/>
                 <a:sym typeface="Calibri"/>
               </a:rPr>
-              <a:t>  ~20-30 s first load, then fast</a:t>
+              <a:t>Persists between warm restarts</a:t>
             </a:r>
             <a:endParaRPr/>
           </a:p>
@@ -24188,7 +24188,7 @@
                 <a:cs typeface="Calibri"/>
                 <a:sym typeface="Calibri"/>
               </a:rPr>
-              <a:t>System prompt forbids external knowledge. Fallback string enforced for out-of-corpus questions. NEW: add minimum similarity threshold (≥ 0.65) — Q4 demonstrated confident answer at sim=0.51. Post-retrieval faithfulness check: flag answers not entailed by retrieved chunks.</a:t>
+              <a:t>System prompt forbids external knowledge. Fallback string enforced. ADD: minimum similarity threshold (&gt;=0.65) to prevent low-confidence answers. Post-retrieval faithfulness check: flag answers not entailed by retrieved chunks.</a:t>
             </a:r>
             <a:endParaRPr/>
           </a:p>

</xml_diff>